<commit_message>
ppt e remover mensagem
</commit_message>
<xml_diff>
--- a/AEDA2021Parte2_Turma7_G7/TransaçõesOnlineParte2.pptx
+++ b/AEDA2021Parte2_Turma7_G7/TransaçõesOnlineParte2.pptx
@@ -111,6 +111,11 @@
       </a:defRPr>
     </a:lvl9pPr>
   </p:defaultTextStyle>
+  <p:extLst>
+    <p:ext uri="{EFAFB233-063F-42B5-8137-9DF3F51BA10A}">
+      <p15:sldGuideLst xmlns:p15="http://schemas.microsoft.com/office/powerpoint/2012/main"/>
+    </p:ext>
+  </p:extLst>
 </p:presentation>
 </file>
 
@@ -171,7 +176,7 @@
           <a:noFill/>
           <a:extLst>
             <a:ext uri="{909E8E84-426E-40dd-AFC4-6F175D3DCCD1}">
-              <a14:hiddenFill xmlns:a14="http://schemas.microsoft.com/office/drawing/2010/main" xmlns="">
+              <a14:hiddenFill xmlns="" xmlns:a14="http://schemas.microsoft.com/office/drawing/2010/main">
                 <a:solidFill>
                   <a:srgbClr val="FFFFFF"/>
                 </a:solidFill>
@@ -230,7 +235,7 @@
             </a:ln>
             <a:extLst>
               <a:ext uri="{91240B29-F687-4f45-9708-019B960494DF}">
-                <a14:hiddenLine xmlns:a14="http://schemas.microsoft.com/office/drawing/2010/main" xmlns="" w="9525">
+                <a14:hiddenLine xmlns="" xmlns:a14="http://schemas.microsoft.com/office/drawing/2010/main" w="9525">
                   <a:solidFill>
                     <a:srgbClr val="000000"/>
                   </a:solidFill>
@@ -320,7 +325,7 @@
             </a:ln>
             <a:extLst>
               <a:ext uri="{91240B29-F687-4f45-9708-019B960494DF}">
-                <a14:hiddenLine xmlns:a14="http://schemas.microsoft.com/office/drawing/2010/main" xmlns="" w="9525">
+                <a14:hiddenLine xmlns="" xmlns:a14="http://schemas.microsoft.com/office/drawing/2010/main" w="9525">
                   <a:solidFill>
                     <a:srgbClr val="000000"/>
                   </a:solidFill>
@@ -410,7 +415,7 @@
             </a:ln>
             <a:extLst>
               <a:ext uri="{91240B29-F687-4f45-9708-019B960494DF}">
-                <a14:hiddenLine xmlns:a14="http://schemas.microsoft.com/office/drawing/2010/main" xmlns="" w="9525">
+                <a14:hiddenLine xmlns="" xmlns:a14="http://schemas.microsoft.com/office/drawing/2010/main" w="9525">
                   <a:solidFill>
                     <a:srgbClr val="000000"/>
                   </a:solidFill>
@@ -444,7 +449,7 @@
             </a:ln>
             <a:extLst>
               <a:ext uri="{91240B29-F687-4f45-9708-019B960494DF}">
-                <a14:hiddenLine xmlns:a14="http://schemas.microsoft.com/office/drawing/2010/main" xmlns="" w="9525">
+                <a14:hiddenLine xmlns="" xmlns:a14="http://schemas.microsoft.com/office/drawing/2010/main" w="9525">
                   <a:solidFill>
                     <a:srgbClr val="000000"/>
                   </a:solidFill>
@@ -534,7 +539,7 @@
             </a:ln>
             <a:extLst>
               <a:ext uri="{91240B29-F687-4f45-9708-019B960494DF}">
-                <a14:hiddenLine xmlns:a14="http://schemas.microsoft.com/office/drawing/2010/main" xmlns="" w="9525">
+                <a14:hiddenLine xmlns="" xmlns:a14="http://schemas.microsoft.com/office/drawing/2010/main" w="9525">
                   <a:solidFill>
                     <a:srgbClr val="000000"/>
                   </a:solidFill>
@@ -596,7 +601,7 @@
             </a:ln>
             <a:extLst>
               <a:ext uri="{91240B29-F687-4f45-9708-019B960494DF}">
-                <a14:hiddenLine xmlns:a14="http://schemas.microsoft.com/office/drawing/2010/main" xmlns="" w="9525">
+                <a14:hiddenLine xmlns="" xmlns:a14="http://schemas.microsoft.com/office/drawing/2010/main" w="9525">
                   <a:solidFill>
                     <a:srgbClr val="000000"/>
                   </a:solidFill>
@@ -658,7 +663,7 @@
             </a:ln>
             <a:extLst>
               <a:ext uri="{91240B29-F687-4f45-9708-019B960494DF}">
-                <a14:hiddenLine xmlns:a14="http://schemas.microsoft.com/office/drawing/2010/main" xmlns="" w="9525">
+                <a14:hiddenLine xmlns="" xmlns:a14="http://schemas.microsoft.com/office/drawing/2010/main" w="9525">
                   <a:solidFill>
                     <a:srgbClr val="000000"/>
                   </a:solidFill>
@@ -748,7 +753,7 @@
             </a:ln>
             <a:extLst>
               <a:ext uri="{91240B29-F687-4f45-9708-019B960494DF}">
-                <a14:hiddenLine xmlns:a14="http://schemas.microsoft.com/office/drawing/2010/main" xmlns="" w="9525">
+                <a14:hiddenLine xmlns="" xmlns:a14="http://schemas.microsoft.com/office/drawing/2010/main" w="9525">
                   <a:solidFill>
                     <a:srgbClr val="000000"/>
                   </a:solidFill>
@@ -810,7 +815,7 @@
             </a:ln>
             <a:extLst>
               <a:ext uri="{91240B29-F687-4f45-9708-019B960494DF}">
-                <a14:hiddenLine xmlns:a14="http://schemas.microsoft.com/office/drawing/2010/main" xmlns="" w="9525">
+                <a14:hiddenLine xmlns="" xmlns:a14="http://schemas.microsoft.com/office/drawing/2010/main" w="9525">
                   <a:solidFill>
                     <a:srgbClr val="000000"/>
                   </a:solidFill>
@@ -872,7 +877,7 @@
             </a:ln>
             <a:extLst>
               <a:ext uri="{91240B29-F687-4f45-9708-019B960494DF}">
-                <a14:hiddenLine xmlns:a14="http://schemas.microsoft.com/office/drawing/2010/main" xmlns="" w="9525">
+                <a14:hiddenLine xmlns="" xmlns:a14="http://schemas.microsoft.com/office/drawing/2010/main" w="9525">
                   <a:solidFill>
                     <a:srgbClr val="000000"/>
                   </a:solidFill>
@@ -962,7 +967,7 @@
             </a:ln>
             <a:extLst>
               <a:ext uri="{91240B29-F687-4f45-9708-019B960494DF}">
-                <a14:hiddenLine xmlns:a14="http://schemas.microsoft.com/office/drawing/2010/main" xmlns="" w="9525">
+                <a14:hiddenLine xmlns="" xmlns:a14="http://schemas.microsoft.com/office/drawing/2010/main" w="9525">
                   <a:solidFill>
                     <a:srgbClr val="000000"/>
                   </a:solidFill>
@@ -1052,7 +1057,7 @@
             </a:ln>
             <a:extLst>
               <a:ext uri="{91240B29-F687-4f45-9708-019B960494DF}">
-                <a14:hiddenLine xmlns:a14="http://schemas.microsoft.com/office/drawing/2010/main" xmlns="" w="9525">
+                <a14:hiddenLine xmlns="" xmlns:a14="http://schemas.microsoft.com/office/drawing/2010/main" w="9525">
                   <a:solidFill>
                     <a:srgbClr val="000000"/>
                   </a:solidFill>
@@ -1114,7 +1119,7 @@
             </a:ln>
             <a:extLst>
               <a:ext uri="{91240B29-F687-4f45-9708-019B960494DF}">
-                <a14:hiddenLine xmlns:a14="http://schemas.microsoft.com/office/drawing/2010/main" xmlns="" w="9525">
+                <a14:hiddenLine xmlns="" xmlns:a14="http://schemas.microsoft.com/office/drawing/2010/main" w="9525">
                   <a:solidFill>
                     <a:srgbClr val="000000"/>
                   </a:solidFill>
@@ -1224,7 +1229,7 @@
             </a:ln>
             <a:extLst>
               <a:ext uri="{91240B29-F687-4f45-9708-019B960494DF}">
-                <a14:hiddenLine xmlns:a14="http://schemas.microsoft.com/office/drawing/2010/main" xmlns="" w="9525">
+                <a14:hiddenLine xmlns="" xmlns:a14="http://schemas.microsoft.com/office/drawing/2010/main" w="9525">
                   <a:solidFill>
                     <a:srgbClr val="000000"/>
                   </a:solidFill>
@@ -1286,7 +1291,7 @@
             </a:ln>
             <a:extLst>
               <a:ext uri="{91240B29-F687-4f45-9708-019B960494DF}">
-                <a14:hiddenLine xmlns:a14="http://schemas.microsoft.com/office/drawing/2010/main" xmlns="" w="9525">
+                <a14:hiddenLine xmlns="" xmlns:a14="http://schemas.microsoft.com/office/drawing/2010/main" w="9525">
                   <a:solidFill>
                     <a:srgbClr val="000000"/>
                   </a:solidFill>
@@ -1376,7 +1381,7 @@
             </a:ln>
             <a:extLst>
               <a:ext uri="{91240B29-F687-4f45-9708-019B960494DF}">
-                <a14:hiddenLine xmlns:a14="http://schemas.microsoft.com/office/drawing/2010/main" xmlns="" w="9525">
+                <a14:hiddenLine xmlns="" xmlns:a14="http://schemas.microsoft.com/office/drawing/2010/main" w="9525">
                   <a:solidFill>
                     <a:srgbClr val="000000"/>
                   </a:solidFill>
@@ -1466,7 +1471,7 @@
             </a:ln>
             <a:extLst>
               <a:ext uri="{91240B29-F687-4f45-9708-019B960494DF}">
-                <a14:hiddenLine xmlns:a14="http://schemas.microsoft.com/office/drawing/2010/main" xmlns="" w="9525">
+                <a14:hiddenLine xmlns="" xmlns:a14="http://schemas.microsoft.com/office/drawing/2010/main" w="9525">
                   <a:solidFill>
                     <a:srgbClr val="000000"/>
                   </a:solidFill>
@@ -1528,7 +1533,7 @@
             </a:ln>
             <a:extLst>
               <a:ext uri="{91240B29-F687-4f45-9708-019B960494DF}">
-                <a14:hiddenLine xmlns:a14="http://schemas.microsoft.com/office/drawing/2010/main" xmlns="" w="9525">
+                <a14:hiddenLine xmlns="" xmlns:a14="http://schemas.microsoft.com/office/drawing/2010/main" w="9525">
                   <a:solidFill>
                     <a:srgbClr val="000000"/>
                   </a:solidFill>
@@ -1618,7 +1623,7 @@
             </a:ln>
             <a:extLst>
               <a:ext uri="{91240B29-F687-4f45-9708-019B960494DF}">
-                <a14:hiddenLine xmlns:a14="http://schemas.microsoft.com/office/drawing/2010/main" xmlns="" w="9525">
+                <a14:hiddenLine xmlns="" xmlns:a14="http://schemas.microsoft.com/office/drawing/2010/main" w="9525">
                   <a:solidFill>
                     <a:srgbClr val="000000"/>
                   </a:solidFill>
@@ -1708,7 +1713,7 @@
             </a:ln>
             <a:extLst>
               <a:ext uri="{91240B29-F687-4f45-9708-019B960494DF}">
-                <a14:hiddenLine xmlns:a14="http://schemas.microsoft.com/office/drawing/2010/main" xmlns="" w="9525">
+                <a14:hiddenLine xmlns="" xmlns:a14="http://schemas.microsoft.com/office/drawing/2010/main" w="9525">
                   <a:solidFill>
                     <a:srgbClr val="000000"/>
                   </a:solidFill>
@@ -1764,7 +1769,7 @@
             </a:ln>
             <a:extLst>
               <a:ext uri="{91240B29-F687-4f45-9708-019B960494DF}">
-                <a14:hiddenLine xmlns:a14="http://schemas.microsoft.com/office/drawing/2010/main" xmlns="" w="9525">
+                <a14:hiddenLine xmlns="" xmlns:a14="http://schemas.microsoft.com/office/drawing/2010/main" w="9525">
                   <a:solidFill>
                     <a:srgbClr val="000000"/>
                   </a:solidFill>
@@ -1854,7 +1859,7 @@
             </a:ln>
             <a:extLst>
               <a:ext uri="{91240B29-F687-4f45-9708-019B960494DF}">
-                <a14:hiddenLine xmlns:a14="http://schemas.microsoft.com/office/drawing/2010/main" xmlns="" w="9525">
+                <a14:hiddenLine xmlns="" xmlns:a14="http://schemas.microsoft.com/office/drawing/2010/main" w="9525">
                   <a:solidFill>
                     <a:srgbClr val="000000"/>
                   </a:solidFill>
@@ -1910,7 +1915,7 @@
             </a:ln>
             <a:extLst>
               <a:ext uri="{91240B29-F687-4f45-9708-019B960494DF}">
-                <a14:hiddenLine xmlns:a14="http://schemas.microsoft.com/office/drawing/2010/main" xmlns="" w="9525">
+                <a14:hiddenLine xmlns="" xmlns:a14="http://schemas.microsoft.com/office/drawing/2010/main" w="9525">
                   <a:solidFill>
                     <a:srgbClr val="000000"/>
                   </a:solidFill>
@@ -2000,7 +2005,7 @@
             </a:ln>
             <a:extLst>
               <a:ext uri="{91240B29-F687-4f45-9708-019B960494DF}">
-                <a14:hiddenLine xmlns:a14="http://schemas.microsoft.com/office/drawing/2010/main" xmlns="" w="9525">
+                <a14:hiddenLine xmlns="" xmlns:a14="http://schemas.microsoft.com/office/drawing/2010/main" w="9525">
                   <a:solidFill>
                     <a:srgbClr val="000000"/>
                   </a:solidFill>
@@ -2068,7 +2073,7 @@
             </a:ln>
             <a:extLst>
               <a:ext uri="{91240B29-F687-4f45-9708-019B960494DF}">
-                <a14:hiddenLine xmlns:a14="http://schemas.microsoft.com/office/drawing/2010/main" xmlns="" w="9525">
+                <a14:hiddenLine xmlns="" xmlns:a14="http://schemas.microsoft.com/office/drawing/2010/main" w="9525">
                   <a:solidFill>
                     <a:srgbClr val="000000"/>
                   </a:solidFill>
@@ -2158,7 +2163,7 @@
             </a:ln>
             <a:extLst>
               <a:ext uri="{91240B29-F687-4f45-9708-019B960494DF}">
-                <a14:hiddenLine xmlns:a14="http://schemas.microsoft.com/office/drawing/2010/main" xmlns="" w="9525">
+                <a14:hiddenLine xmlns="" xmlns:a14="http://schemas.microsoft.com/office/drawing/2010/main" w="9525">
                   <a:solidFill>
                     <a:srgbClr val="000000"/>
                   </a:solidFill>
@@ -2226,7 +2231,7 @@
             </a:ln>
             <a:extLst>
               <a:ext uri="{91240B29-F687-4f45-9708-019B960494DF}">
-                <a14:hiddenLine xmlns:a14="http://schemas.microsoft.com/office/drawing/2010/main" xmlns="" w="9525">
+                <a14:hiddenLine xmlns="" xmlns:a14="http://schemas.microsoft.com/office/drawing/2010/main" w="9525">
                   <a:solidFill>
                     <a:srgbClr val="000000"/>
                   </a:solidFill>
@@ -2316,7 +2321,7 @@
             </a:ln>
             <a:extLst>
               <a:ext uri="{91240B29-F687-4f45-9708-019B960494DF}">
-                <a14:hiddenLine xmlns:a14="http://schemas.microsoft.com/office/drawing/2010/main" xmlns="" w="9525">
+                <a14:hiddenLine xmlns="" xmlns:a14="http://schemas.microsoft.com/office/drawing/2010/main" w="9525">
                   <a:solidFill>
                     <a:srgbClr val="000000"/>
                   </a:solidFill>
@@ -2350,7 +2355,7 @@
             </a:ln>
             <a:extLst>
               <a:ext uri="{91240B29-F687-4f45-9708-019B960494DF}">
-                <a14:hiddenLine xmlns:a14="http://schemas.microsoft.com/office/drawing/2010/main" xmlns="" w="9525">
+                <a14:hiddenLine xmlns="" xmlns:a14="http://schemas.microsoft.com/office/drawing/2010/main" w="9525">
                   <a:solidFill>
                     <a:srgbClr val="000000"/>
                   </a:solidFill>
@@ -2440,7 +2445,7 @@
             </a:ln>
             <a:extLst>
               <a:ext uri="{91240B29-F687-4f45-9708-019B960494DF}">
-                <a14:hiddenLine xmlns:a14="http://schemas.microsoft.com/office/drawing/2010/main" xmlns="" w="9525">
+                <a14:hiddenLine xmlns="" xmlns:a14="http://schemas.microsoft.com/office/drawing/2010/main" w="9525">
                   <a:solidFill>
                     <a:srgbClr val="000000"/>
                   </a:solidFill>
@@ -2502,7 +2507,7 @@
             </a:ln>
             <a:extLst>
               <a:ext uri="{91240B29-F687-4f45-9708-019B960494DF}">
-                <a14:hiddenLine xmlns:a14="http://schemas.microsoft.com/office/drawing/2010/main" xmlns="" w="9525">
+                <a14:hiddenLine xmlns="" xmlns:a14="http://schemas.microsoft.com/office/drawing/2010/main" w="9525">
                   <a:solidFill>
                     <a:srgbClr val="000000"/>
                   </a:solidFill>
@@ -2564,7 +2569,7 @@
             </a:ln>
             <a:extLst>
               <a:ext uri="{91240B29-F687-4f45-9708-019B960494DF}">
-                <a14:hiddenLine xmlns:a14="http://schemas.microsoft.com/office/drawing/2010/main" xmlns="" w="9525">
+                <a14:hiddenLine xmlns="" xmlns:a14="http://schemas.microsoft.com/office/drawing/2010/main" w="9525">
                   <a:solidFill>
                     <a:srgbClr val="000000"/>
                   </a:solidFill>
@@ -2654,7 +2659,7 @@
             </a:ln>
             <a:extLst>
               <a:ext uri="{91240B29-F687-4f45-9708-019B960494DF}">
-                <a14:hiddenLine xmlns:a14="http://schemas.microsoft.com/office/drawing/2010/main" xmlns="" w="9525">
+                <a14:hiddenLine xmlns="" xmlns:a14="http://schemas.microsoft.com/office/drawing/2010/main" w="9525">
                   <a:solidFill>
                     <a:srgbClr val="000000"/>
                   </a:solidFill>
@@ -2722,7 +2727,7 @@
             </a:ln>
             <a:extLst>
               <a:ext uri="{91240B29-F687-4f45-9708-019B960494DF}">
-                <a14:hiddenLine xmlns:a14="http://schemas.microsoft.com/office/drawing/2010/main" xmlns="" w="9525">
+                <a14:hiddenLine xmlns="" xmlns:a14="http://schemas.microsoft.com/office/drawing/2010/main" w="9525">
                   <a:solidFill>
                     <a:srgbClr val="000000"/>
                   </a:solidFill>
@@ -2784,7 +2789,7 @@
             </a:ln>
             <a:extLst>
               <a:ext uri="{91240B29-F687-4f45-9708-019B960494DF}">
-                <a14:hiddenLine xmlns:a14="http://schemas.microsoft.com/office/drawing/2010/main" xmlns="" w="9525">
+                <a14:hiddenLine xmlns="" xmlns:a14="http://schemas.microsoft.com/office/drawing/2010/main" w="9525">
                   <a:solidFill>
                     <a:srgbClr val="000000"/>
                   </a:solidFill>
@@ -2874,7 +2879,7 @@
             </a:ln>
             <a:extLst>
               <a:ext uri="{91240B29-F687-4f45-9708-019B960494DF}">
-                <a14:hiddenLine xmlns:a14="http://schemas.microsoft.com/office/drawing/2010/main" xmlns="" w="9525">
+                <a14:hiddenLine xmlns="" xmlns:a14="http://schemas.microsoft.com/office/drawing/2010/main" w="9525">
                   <a:solidFill>
                     <a:srgbClr val="000000"/>
                   </a:solidFill>
@@ -2936,7 +2941,7 @@
             </a:ln>
             <a:extLst>
               <a:ext uri="{91240B29-F687-4f45-9708-019B960494DF}">
-                <a14:hiddenLine xmlns:a14="http://schemas.microsoft.com/office/drawing/2010/main" xmlns="" w="9525">
+                <a14:hiddenLine xmlns="" xmlns:a14="http://schemas.microsoft.com/office/drawing/2010/main" w="9525">
                   <a:solidFill>
                     <a:srgbClr val="000000"/>
                   </a:solidFill>
@@ -3026,7 +3031,7 @@
             </a:ln>
             <a:extLst>
               <a:ext uri="{91240B29-F687-4f45-9708-019B960494DF}">
-                <a14:hiddenLine xmlns:a14="http://schemas.microsoft.com/office/drawing/2010/main" xmlns="" w="9525">
+                <a14:hiddenLine xmlns="" xmlns:a14="http://schemas.microsoft.com/office/drawing/2010/main" w="9525">
                   <a:solidFill>
                     <a:srgbClr val="000000"/>
                   </a:solidFill>
@@ -3088,7 +3093,7 @@
             </a:ln>
             <a:extLst>
               <a:ext uri="{91240B29-F687-4f45-9708-019B960494DF}">
-                <a14:hiddenLine xmlns:a14="http://schemas.microsoft.com/office/drawing/2010/main" xmlns="" w="9525">
+                <a14:hiddenLine xmlns="" xmlns:a14="http://schemas.microsoft.com/office/drawing/2010/main" w="9525">
                   <a:solidFill>
                     <a:srgbClr val="000000"/>
                   </a:solidFill>
@@ -3178,7 +3183,7 @@
             </a:ln>
             <a:extLst>
               <a:ext uri="{91240B29-F687-4f45-9708-019B960494DF}">
-                <a14:hiddenLine xmlns:a14="http://schemas.microsoft.com/office/drawing/2010/main" xmlns="" w="9525">
+                <a14:hiddenLine xmlns="" xmlns:a14="http://schemas.microsoft.com/office/drawing/2010/main" w="9525">
                   <a:solidFill>
                     <a:srgbClr val="000000"/>
                   </a:solidFill>
@@ -3212,7 +3217,7 @@
             </a:ln>
             <a:extLst>
               <a:ext uri="{91240B29-F687-4f45-9708-019B960494DF}">
-                <a14:hiddenLine xmlns:a14="http://schemas.microsoft.com/office/drawing/2010/main" xmlns="" w="9525">
+                <a14:hiddenLine xmlns="" xmlns:a14="http://schemas.microsoft.com/office/drawing/2010/main" w="9525">
                   <a:solidFill>
                     <a:srgbClr val="000000"/>
                   </a:solidFill>
@@ -3277,7 +3282,7 @@
             </a:ln>
             <a:extLst>
               <a:ext uri="{91240B29-F687-4f45-9708-019B960494DF}">
-                <a14:hiddenLine xmlns:a14="http://schemas.microsoft.com/office/drawing/2010/main" xmlns="" w="9525">
+                <a14:hiddenLine xmlns="" xmlns:a14="http://schemas.microsoft.com/office/drawing/2010/main" w="9525">
                   <a:solidFill>
                     <a:srgbClr val="000000"/>
                   </a:solidFill>
@@ -3367,7 +3372,7 @@
             </a:ln>
             <a:extLst>
               <a:ext uri="{91240B29-F687-4f45-9708-019B960494DF}">
-                <a14:hiddenLine xmlns:a14="http://schemas.microsoft.com/office/drawing/2010/main" xmlns="" w="9525">
+                <a14:hiddenLine xmlns="" xmlns:a14="http://schemas.microsoft.com/office/drawing/2010/main" w="9525">
                   <a:solidFill>
                     <a:srgbClr val="000000"/>
                   </a:solidFill>
@@ -3429,7 +3434,7 @@
             </a:ln>
             <a:extLst>
               <a:ext uri="{91240B29-F687-4f45-9708-019B960494DF}">
-                <a14:hiddenLine xmlns:a14="http://schemas.microsoft.com/office/drawing/2010/main" xmlns="" w="9525">
+                <a14:hiddenLine xmlns="" xmlns:a14="http://schemas.microsoft.com/office/drawing/2010/main" w="9525">
                   <a:solidFill>
                     <a:srgbClr val="000000"/>
                   </a:solidFill>
@@ -3519,7 +3524,7 @@
             </a:ln>
             <a:extLst>
               <a:ext uri="{91240B29-F687-4f45-9708-019B960494DF}">
-                <a14:hiddenLine xmlns:a14="http://schemas.microsoft.com/office/drawing/2010/main" xmlns="" w="9525">
+                <a14:hiddenLine xmlns="" xmlns:a14="http://schemas.microsoft.com/office/drawing/2010/main" w="9525">
                   <a:solidFill>
                     <a:srgbClr val="000000"/>
                   </a:solidFill>
@@ -3609,7 +3614,7 @@
             </a:ln>
             <a:extLst>
               <a:ext uri="{91240B29-F687-4f45-9708-019B960494DF}">
-                <a14:hiddenLine xmlns:a14="http://schemas.microsoft.com/office/drawing/2010/main" xmlns="" w="9525">
+                <a14:hiddenLine xmlns="" xmlns:a14="http://schemas.microsoft.com/office/drawing/2010/main" w="9525">
                   <a:solidFill>
                     <a:srgbClr val="000000"/>
                   </a:solidFill>
@@ -3674,7 +3679,7 @@
             </a:ln>
             <a:extLst>
               <a:ext uri="{91240B29-F687-4f45-9708-019B960494DF}">
-                <a14:hiddenLine xmlns:a14="http://schemas.microsoft.com/office/drawing/2010/main" xmlns="" w="9525">
+                <a14:hiddenLine xmlns="" xmlns:a14="http://schemas.microsoft.com/office/drawing/2010/main" w="9525">
                   <a:solidFill>
                     <a:srgbClr val="000000"/>
                   </a:solidFill>
@@ -3736,7 +3741,7 @@
             </a:ln>
             <a:extLst>
               <a:ext uri="{91240B29-F687-4f45-9708-019B960494DF}">
-                <a14:hiddenLine xmlns:a14="http://schemas.microsoft.com/office/drawing/2010/main" xmlns="" w="9525">
+                <a14:hiddenLine xmlns="" xmlns:a14="http://schemas.microsoft.com/office/drawing/2010/main" w="9525">
                   <a:solidFill>
                     <a:srgbClr val="000000"/>
                   </a:solidFill>
@@ -3826,7 +3831,7 @@
             </a:ln>
             <a:extLst>
               <a:ext uri="{91240B29-F687-4f45-9708-019B960494DF}">
-                <a14:hiddenLine xmlns:a14="http://schemas.microsoft.com/office/drawing/2010/main" xmlns="" w="9525">
+                <a14:hiddenLine xmlns="" xmlns:a14="http://schemas.microsoft.com/office/drawing/2010/main" w="9525">
                   <a:solidFill>
                     <a:srgbClr val="000000"/>
                   </a:solidFill>
@@ -3916,7 +3921,7 @@
             </a:ln>
             <a:extLst>
               <a:ext uri="{91240B29-F687-4f45-9708-019B960494DF}">
-                <a14:hiddenLine xmlns:a14="http://schemas.microsoft.com/office/drawing/2010/main" xmlns="" w="9525">
+                <a14:hiddenLine xmlns="" xmlns:a14="http://schemas.microsoft.com/office/drawing/2010/main" w="9525">
                   <a:solidFill>
                     <a:srgbClr val="000000"/>
                   </a:solidFill>
@@ -3978,7 +3983,7 @@
             </a:ln>
             <a:extLst>
               <a:ext uri="{91240B29-F687-4f45-9708-019B960494DF}">
-                <a14:hiddenLine xmlns:a14="http://schemas.microsoft.com/office/drawing/2010/main" xmlns="" w="9525">
+                <a14:hiddenLine xmlns="" xmlns:a14="http://schemas.microsoft.com/office/drawing/2010/main" w="9525">
                   <a:solidFill>
                     <a:srgbClr val="000000"/>
                   </a:solidFill>
@@ -4098,7 +4103,7 @@
             </a:ln>
             <a:extLst>
               <a:ext uri="{91240B29-F687-4f45-9708-019B960494DF}">
-                <a14:hiddenLine xmlns:a14="http://schemas.microsoft.com/office/drawing/2010/main" xmlns="" w="9525">
+                <a14:hiddenLine xmlns="" xmlns:a14="http://schemas.microsoft.com/office/drawing/2010/main" w="9525">
                   <a:solidFill>
                     <a:srgbClr val="000000"/>
                   </a:solidFill>
@@ -4166,7 +4171,7 @@
             </a:ln>
             <a:extLst>
               <a:ext uri="{91240B29-F687-4f45-9708-019B960494DF}">
-                <a14:hiddenLine xmlns:a14="http://schemas.microsoft.com/office/drawing/2010/main" xmlns="" w="9525">
+                <a14:hiddenLine xmlns="" xmlns:a14="http://schemas.microsoft.com/office/drawing/2010/main" w="9525">
                   <a:solidFill>
                     <a:srgbClr val="000000"/>
                   </a:solidFill>
@@ -4256,7 +4261,7 @@
             </a:ln>
             <a:extLst>
               <a:ext uri="{91240B29-F687-4f45-9708-019B960494DF}">
-                <a14:hiddenLine xmlns:a14="http://schemas.microsoft.com/office/drawing/2010/main" xmlns="" w="9525">
+                <a14:hiddenLine xmlns="" xmlns:a14="http://schemas.microsoft.com/office/drawing/2010/main" w="9525">
                   <a:solidFill>
                     <a:srgbClr val="000000"/>
                   </a:solidFill>
@@ -9070,7 +9075,7 @@
           <a:noFill/>
           <a:extLst>
             <a:ext uri="{909E8E84-426E-40dd-AFC4-6F175D3DCCD1}">
-              <a14:hiddenFill xmlns:a14="http://schemas.microsoft.com/office/drawing/2010/main" xmlns="">
+              <a14:hiddenFill xmlns="" xmlns:a14="http://schemas.microsoft.com/office/drawing/2010/main">
                 <a:solidFill>
                   <a:srgbClr val="FFFFFF"/>
                 </a:solidFill>
@@ -9144,7 +9149,7 @@
               </a:ln>
               <a:extLst>
                 <a:ext uri="{91240B29-F687-4f45-9708-019B960494DF}">
-                  <a14:hiddenLine xmlns:a14="http://schemas.microsoft.com/office/drawing/2010/main" xmlns="" w="9525">
+                  <a14:hiddenLine xmlns="" xmlns:a14="http://schemas.microsoft.com/office/drawing/2010/main" w="9525">
                     <a:solidFill>
                       <a:srgbClr val="000000"/>
                     </a:solidFill>
@@ -9234,7 +9239,7 @@
               </a:ln>
               <a:extLst>
                 <a:ext uri="{91240B29-F687-4f45-9708-019B960494DF}">
-                  <a14:hiddenLine xmlns:a14="http://schemas.microsoft.com/office/drawing/2010/main" xmlns="" w="9525">
+                  <a14:hiddenLine xmlns="" xmlns:a14="http://schemas.microsoft.com/office/drawing/2010/main" w="9525">
                     <a:solidFill>
                       <a:srgbClr val="000000"/>
                     </a:solidFill>
@@ -9324,7 +9329,7 @@
               </a:ln>
               <a:extLst>
                 <a:ext uri="{91240B29-F687-4f45-9708-019B960494DF}">
-                  <a14:hiddenLine xmlns:a14="http://schemas.microsoft.com/office/drawing/2010/main" xmlns="" w="9525">
+                  <a14:hiddenLine xmlns="" xmlns:a14="http://schemas.microsoft.com/office/drawing/2010/main" w="9525">
                     <a:solidFill>
                       <a:srgbClr val="000000"/>
                     </a:solidFill>
@@ -9386,7 +9391,7 @@
               </a:ln>
               <a:extLst>
                 <a:ext uri="{91240B29-F687-4f45-9708-019B960494DF}">
-                  <a14:hiddenLine xmlns:a14="http://schemas.microsoft.com/office/drawing/2010/main" xmlns="" w="9525">
+                  <a14:hiddenLine xmlns="" xmlns:a14="http://schemas.microsoft.com/office/drawing/2010/main" w="9525">
                     <a:solidFill>
                       <a:srgbClr val="000000"/>
                     </a:solidFill>
@@ -9476,7 +9481,7 @@
               </a:ln>
               <a:extLst>
                 <a:ext uri="{91240B29-F687-4f45-9708-019B960494DF}">
-                  <a14:hiddenLine xmlns:a14="http://schemas.microsoft.com/office/drawing/2010/main" xmlns="" w="9525">
+                  <a14:hiddenLine xmlns="" xmlns:a14="http://schemas.microsoft.com/office/drawing/2010/main" w="9525">
                     <a:solidFill>
                       <a:srgbClr val="000000"/>
                     </a:solidFill>
@@ -9538,7 +9543,7 @@
               </a:ln>
               <a:extLst>
                 <a:ext uri="{91240B29-F687-4f45-9708-019B960494DF}">
-                  <a14:hiddenLine xmlns:a14="http://schemas.microsoft.com/office/drawing/2010/main" xmlns="" w="9525">
+                  <a14:hiddenLine xmlns="" xmlns:a14="http://schemas.microsoft.com/office/drawing/2010/main" w="9525">
                     <a:solidFill>
                       <a:srgbClr val="000000"/>
                     </a:solidFill>
@@ -9600,7 +9605,7 @@
               </a:ln>
               <a:extLst>
                 <a:ext uri="{91240B29-F687-4f45-9708-019B960494DF}">
-                  <a14:hiddenLine xmlns:a14="http://schemas.microsoft.com/office/drawing/2010/main" xmlns="" w="9525">
+                  <a14:hiddenLine xmlns="" xmlns:a14="http://schemas.microsoft.com/office/drawing/2010/main" w="9525">
                     <a:solidFill>
                       <a:srgbClr val="000000"/>
                     </a:solidFill>
@@ -9690,7 +9695,7 @@
               </a:ln>
               <a:extLst>
                 <a:ext uri="{91240B29-F687-4f45-9708-019B960494DF}">
-                  <a14:hiddenLine xmlns:a14="http://schemas.microsoft.com/office/drawing/2010/main" xmlns="" w="9525">
+                  <a14:hiddenLine xmlns="" xmlns:a14="http://schemas.microsoft.com/office/drawing/2010/main" w="9525">
                     <a:solidFill>
                       <a:srgbClr val="000000"/>
                     </a:solidFill>
@@ -9780,7 +9785,7 @@
               </a:ln>
               <a:extLst>
                 <a:ext uri="{91240B29-F687-4f45-9708-019B960494DF}">
-                  <a14:hiddenLine xmlns:a14="http://schemas.microsoft.com/office/drawing/2010/main" xmlns="" w="9525">
+                  <a14:hiddenLine xmlns="" xmlns:a14="http://schemas.microsoft.com/office/drawing/2010/main" w="9525">
                     <a:solidFill>
                       <a:srgbClr val="000000"/>
                     </a:solidFill>
@@ -9842,7 +9847,7 @@
               </a:ln>
               <a:extLst>
                 <a:ext uri="{91240B29-F687-4f45-9708-019B960494DF}">
-                  <a14:hiddenLine xmlns:a14="http://schemas.microsoft.com/office/drawing/2010/main" xmlns="" w="9525">
+                  <a14:hiddenLine xmlns="" xmlns:a14="http://schemas.microsoft.com/office/drawing/2010/main" w="9525">
                     <a:solidFill>
                       <a:srgbClr val="000000"/>
                     </a:solidFill>
@@ -9952,7 +9957,7 @@
               </a:ln>
               <a:extLst>
                 <a:ext uri="{91240B29-F687-4f45-9708-019B960494DF}">
-                  <a14:hiddenLine xmlns:a14="http://schemas.microsoft.com/office/drawing/2010/main" xmlns="" w="9525">
+                  <a14:hiddenLine xmlns="" xmlns:a14="http://schemas.microsoft.com/office/drawing/2010/main" w="9525">
                     <a:solidFill>
                       <a:srgbClr val="000000"/>
                     </a:solidFill>
@@ -10036,7 +10041,7 @@
               </a:ln>
               <a:extLst>
                 <a:ext uri="{91240B29-F687-4f45-9708-019B960494DF}">
-                  <a14:hiddenLine xmlns:a14="http://schemas.microsoft.com/office/drawing/2010/main" xmlns="" w="9525">
+                  <a14:hiddenLine xmlns="" xmlns:a14="http://schemas.microsoft.com/office/drawing/2010/main" w="9525">
                     <a:solidFill>
                       <a:srgbClr val="000000"/>
                     </a:solidFill>
@@ -10098,7 +10103,7 @@
               </a:ln>
               <a:extLst>
                 <a:ext uri="{91240B29-F687-4f45-9708-019B960494DF}">
-                  <a14:hiddenLine xmlns:a14="http://schemas.microsoft.com/office/drawing/2010/main" xmlns="" w="9525">
+                  <a14:hiddenLine xmlns="" xmlns:a14="http://schemas.microsoft.com/office/drawing/2010/main" w="9525">
                     <a:solidFill>
                       <a:srgbClr val="000000"/>
                     </a:solidFill>
@@ -10160,7 +10165,7 @@
               </a:ln>
               <a:extLst>
                 <a:ext uri="{91240B29-F687-4f45-9708-019B960494DF}">
-                  <a14:hiddenLine xmlns:a14="http://schemas.microsoft.com/office/drawing/2010/main" xmlns="" w="9525">
+                  <a14:hiddenLine xmlns="" xmlns:a14="http://schemas.microsoft.com/office/drawing/2010/main" w="9525">
                     <a:solidFill>
                       <a:srgbClr val="000000"/>
                     </a:solidFill>
@@ -10250,7 +10255,7 @@
               </a:ln>
               <a:extLst>
                 <a:ext uri="{91240B29-F687-4f45-9708-019B960494DF}">
-                  <a14:hiddenLine xmlns:a14="http://schemas.microsoft.com/office/drawing/2010/main" xmlns="" w="9525">
+                  <a14:hiddenLine xmlns="" xmlns:a14="http://schemas.microsoft.com/office/drawing/2010/main" w="9525">
                     <a:solidFill>
                       <a:srgbClr val="000000"/>
                     </a:solidFill>
@@ -10284,7 +10289,7 @@
               </a:ln>
               <a:extLst>
                 <a:ext uri="{91240B29-F687-4f45-9708-019B960494DF}">
-                  <a14:hiddenLine xmlns:a14="http://schemas.microsoft.com/office/drawing/2010/main" xmlns="" w="9525">
+                  <a14:hiddenLine xmlns="" xmlns:a14="http://schemas.microsoft.com/office/drawing/2010/main" w="9525">
                     <a:solidFill>
                       <a:srgbClr val="000000"/>
                     </a:solidFill>
@@ -10349,7 +10354,7 @@
               </a:ln>
               <a:extLst>
                 <a:ext uri="{91240B29-F687-4f45-9708-019B960494DF}">
-                  <a14:hiddenLine xmlns:a14="http://schemas.microsoft.com/office/drawing/2010/main" xmlns="" w="9525">
+                  <a14:hiddenLine xmlns="" xmlns:a14="http://schemas.microsoft.com/office/drawing/2010/main" w="9525">
                     <a:solidFill>
                       <a:srgbClr val="000000"/>
                     </a:solidFill>
@@ -10439,7 +10444,7 @@
               </a:ln>
               <a:extLst>
                 <a:ext uri="{91240B29-F687-4f45-9708-019B960494DF}">
-                  <a14:hiddenLine xmlns:a14="http://schemas.microsoft.com/office/drawing/2010/main" xmlns="" w="9525">
+                  <a14:hiddenLine xmlns="" xmlns:a14="http://schemas.microsoft.com/office/drawing/2010/main" w="9525">
                     <a:solidFill>
                       <a:srgbClr val="000000"/>
                     </a:solidFill>
@@ -10501,7 +10506,7 @@
               </a:ln>
               <a:extLst>
                 <a:ext uri="{91240B29-F687-4f45-9708-019B960494DF}">
-                  <a14:hiddenLine xmlns:a14="http://schemas.microsoft.com/office/drawing/2010/main" xmlns="" w="9525">
+                  <a14:hiddenLine xmlns="" xmlns:a14="http://schemas.microsoft.com/office/drawing/2010/main" w="9525">
                     <a:solidFill>
                       <a:srgbClr val="000000"/>
                     </a:solidFill>
@@ -10591,7 +10596,7 @@
               </a:ln>
               <a:extLst>
                 <a:ext uri="{91240B29-F687-4f45-9708-019B960494DF}">
-                  <a14:hiddenLine xmlns:a14="http://schemas.microsoft.com/office/drawing/2010/main" xmlns="" w="9525">
+                  <a14:hiddenLine xmlns="" xmlns:a14="http://schemas.microsoft.com/office/drawing/2010/main" w="9525">
                     <a:solidFill>
                       <a:srgbClr val="000000"/>
                     </a:solidFill>
@@ -10656,7 +10661,7 @@
               </a:ln>
               <a:extLst>
                 <a:ext uri="{91240B29-F687-4f45-9708-019B960494DF}">
-                  <a14:hiddenLine xmlns:a14="http://schemas.microsoft.com/office/drawing/2010/main" xmlns="" w="9525">
+                  <a14:hiddenLine xmlns="" xmlns:a14="http://schemas.microsoft.com/office/drawing/2010/main" w="9525">
                     <a:solidFill>
                       <a:srgbClr val="000000"/>
                     </a:solidFill>
@@ -10718,7 +10723,7 @@
               </a:ln>
               <a:extLst>
                 <a:ext uri="{91240B29-F687-4f45-9708-019B960494DF}">
-                  <a14:hiddenLine xmlns:a14="http://schemas.microsoft.com/office/drawing/2010/main" xmlns="" w="9525">
+                  <a14:hiddenLine xmlns="" xmlns:a14="http://schemas.microsoft.com/office/drawing/2010/main" w="9525">
                     <a:solidFill>
                       <a:srgbClr val="000000"/>
                     </a:solidFill>
@@ -10808,7 +10813,7 @@
               </a:ln>
               <a:extLst>
                 <a:ext uri="{91240B29-F687-4f45-9708-019B960494DF}">
-                  <a14:hiddenLine xmlns:a14="http://schemas.microsoft.com/office/drawing/2010/main" xmlns="" w="9525">
+                  <a14:hiddenLine xmlns="" xmlns:a14="http://schemas.microsoft.com/office/drawing/2010/main" w="9525">
                     <a:solidFill>
                       <a:srgbClr val="000000"/>
                     </a:solidFill>
@@ -10898,7 +10903,7 @@
               </a:ln>
               <a:extLst>
                 <a:ext uri="{91240B29-F687-4f45-9708-019B960494DF}">
-                  <a14:hiddenLine xmlns:a14="http://schemas.microsoft.com/office/drawing/2010/main" xmlns="" w="9525">
+                  <a14:hiddenLine xmlns="" xmlns:a14="http://schemas.microsoft.com/office/drawing/2010/main" w="9525">
                     <a:solidFill>
                       <a:srgbClr val="000000"/>
                     </a:solidFill>
@@ -10963,7 +10968,7 @@
               </a:ln>
               <a:extLst>
                 <a:ext uri="{91240B29-F687-4f45-9708-019B960494DF}">
-                  <a14:hiddenLine xmlns:a14="http://schemas.microsoft.com/office/drawing/2010/main" xmlns="" w="9525">
+                  <a14:hiddenLine xmlns="" xmlns:a14="http://schemas.microsoft.com/office/drawing/2010/main" w="9525">
                     <a:solidFill>
                       <a:srgbClr val="000000"/>
                     </a:solidFill>
@@ -11083,7 +11088,7 @@
               </a:ln>
               <a:extLst>
                 <a:ext uri="{91240B29-F687-4f45-9708-019B960494DF}">
-                  <a14:hiddenLine xmlns:a14="http://schemas.microsoft.com/office/drawing/2010/main" xmlns="" w="9525">
+                  <a14:hiddenLine xmlns="" xmlns:a14="http://schemas.microsoft.com/office/drawing/2010/main" w="9525">
                     <a:solidFill>
                       <a:srgbClr val="000000"/>
                     </a:solidFill>
@@ -11164,7 +11169,7 @@
               </a:ln>
               <a:extLst>
                 <a:ext uri="{91240B29-F687-4f45-9708-019B960494DF}">
-                  <a14:hiddenLine xmlns:a14="http://schemas.microsoft.com/office/drawing/2010/main" xmlns="" w="9525">
+                  <a14:hiddenLine xmlns="" xmlns:a14="http://schemas.microsoft.com/office/drawing/2010/main" w="9525">
                     <a:solidFill>
                       <a:srgbClr val="000000"/>
                     </a:solidFill>
@@ -11279,7 +11284,7 @@
               </a:ln>
               <a:extLst>
                 <a:ext uri="{91240B29-F687-4f45-9708-019B960494DF}">
-                  <a14:hiddenLine xmlns:a14="http://schemas.microsoft.com/office/drawing/2010/main" xmlns="" w="9525">
+                  <a14:hiddenLine xmlns="" xmlns:a14="http://schemas.microsoft.com/office/drawing/2010/main" w="9525">
                     <a:solidFill>
                       <a:srgbClr val="000000"/>
                     </a:solidFill>
@@ -11369,7 +11374,7 @@
               </a:ln>
               <a:extLst>
                 <a:ext uri="{91240B29-F687-4f45-9708-019B960494DF}">
-                  <a14:hiddenLine xmlns:a14="http://schemas.microsoft.com/office/drawing/2010/main" xmlns="" w="9525">
+                  <a14:hiddenLine xmlns="" xmlns:a14="http://schemas.microsoft.com/office/drawing/2010/main" w="9525">
                     <a:solidFill>
                       <a:srgbClr val="000000"/>
                     </a:solidFill>
@@ -11434,7 +11439,7 @@
               </a:ln>
               <a:extLst>
                 <a:ext uri="{91240B29-F687-4f45-9708-019B960494DF}">
-                  <a14:hiddenLine xmlns:a14="http://schemas.microsoft.com/office/drawing/2010/main" xmlns="" w="9525">
+                  <a14:hiddenLine xmlns="" xmlns:a14="http://schemas.microsoft.com/office/drawing/2010/main" w="9525">
                     <a:solidFill>
                       <a:srgbClr val="000000"/>
                     </a:solidFill>
@@ -11524,7 +11529,7 @@
               </a:ln>
               <a:extLst>
                 <a:ext uri="{91240B29-F687-4f45-9708-019B960494DF}">
-                  <a14:hiddenLine xmlns:a14="http://schemas.microsoft.com/office/drawing/2010/main" xmlns="" w="9525">
+                  <a14:hiddenLine xmlns="" xmlns:a14="http://schemas.microsoft.com/office/drawing/2010/main" w="9525">
                     <a:solidFill>
                       <a:srgbClr val="000000"/>
                     </a:solidFill>
@@ -11592,7 +11597,7 @@
               </a:ln>
               <a:extLst>
                 <a:ext uri="{91240B29-F687-4f45-9708-019B960494DF}">
-                  <a14:hiddenLine xmlns:a14="http://schemas.microsoft.com/office/drawing/2010/main" xmlns="" w="9525">
+                  <a14:hiddenLine xmlns="" xmlns:a14="http://schemas.microsoft.com/office/drawing/2010/main" w="9525">
                     <a:solidFill>
                       <a:srgbClr val="000000"/>
                     </a:solidFill>
@@ -11682,7 +11687,7 @@
               </a:ln>
               <a:extLst>
                 <a:ext uri="{91240B29-F687-4f45-9708-019B960494DF}">
-                  <a14:hiddenLine xmlns:a14="http://schemas.microsoft.com/office/drawing/2010/main" xmlns="" w="9525">
+                  <a14:hiddenLine xmlns="" xmlns:a14="http://schemas.microsoft.com/office/drawing/2010/main" w="9525">
                     <a:solidFill>
                       <a:srgbClr val="000000"/>
                     </a:solidFill>
@@ -11750,7 +11755,7 @@
               </a:ln>
               <a:extLst>
                 <a:ext uri="{91240B29-F687-4f45-9708-019B960494DF}">
-                  <a14:hiddenLine xmlns:a14="http://schemas.microsoft.com/office/drawing/2010/main" xmlns="" w="9525">
+                  <a14:hiddenLine xmlns="" xmlns:a14="http://schemas.microsoft.com/office/drawing/2010/main" w="9525">
                     <a:solidFill>
                       <a:srgbClr val="000000"/>
                     </a:solidFill>
@@ -11840,7 +11845,7 @@
               </a:ln>
               <a:extLst>
                 <a:ext uri="{91240B29-F687-4f45-9708-019B960494DF}">
-                  <a14:hiddenLine xmlns:a14="http://schemas.microsoft.com/office/drawing/2010/main" xmlns="" w="9525">
+                  <a14:hiddenLine xmlns="" xmlns:a14="http://schemas.microsoft.com/office/drawing/2010/main" w="9525">
                     <a:solidFill>
                       <a:srgbClr val="000000"/>
                     </a:solidFill>
@@ -11874,7 +11879,7 @@
               </a:ln>
               <a:extLst>
                 <a:ext uri="{91240B29-F687-4f45-9708-019B960494DF}">
-                  <a14:hiddenLine xmlns:a14="http://schemas.microsoft.com/office/drawing/2010/main" xmlns="" w="9525">
+                  <a14:hiddenLine xmlns="" xmlns:a14="http://schemas.microsoft.com/office/drawing/2010/main" w="9525">
                     <a:solidFill>
                       <a:srgbClr val="000000"/>
                     </a:solidFill>
@@ -13014,6 +13019,36 @@
           </a:prstGeom>
         </p:spPr>
       </p:pic>
+      <p:pic>
+        <p:nvPicPr>
+          <p:cNvPr id="4" name="Imagem 3">
+            <a:extLst>
+              <a:ext uri="{FF2B5EF4-FFF2-40B4-BE49-F238E27FC236}">
+                <a16:creationId xmlns:a16="http://schemas.microsoft.com/office/drawing/2014/main" id="{F7219724-ED97-4F79-BF22-4A24E04DDC49}"/>
+              </a:ext>
+            </a:extLst>
+          </p:cNvPr>
+          <p:cNvPicPr>
+            <a:picLocks noChangeAspect="1"/>
+          </p:cNvPicPr>
+          <p:nvPr/>
+        </p:nvPicPr>
+        <p:blipFill>
+          <a:blip r:embed="rId4"/>
+          <a:stretch>
+            <a:fillRect/>
+          </a:stretch>
+        </p:blipFill>
+        <p:spPr>
+          <a:xfrm>
+            <a:off x="7108607" y="1998014"/>
+            <a:ext cx="4343564" cy="4031311"/>
+          </a:xfrm>
+          <a:prstGeom prst="rect">
+            <a:avLst/>
+          </a:prstGeom>
+        </p:spPr>
+      </p:pic>
     </p:spTree>
     <p:extLst>
       <p:ext uri="{BB962C8B-B14F-4D97-AF65-F5344CB8AC3E}">
@@ -13393,37 +13428,20 @@
           </a:bodyPr>
           <a:lstStyle/>
           <a:p>
-            <a:pPr algn="ctr"/>
-            <a:r>
-              <a:rPr lang="pt-PT" sz="4400" dirty="0" err="1">
-                <a:solidFill>
-                  <a:schemeClr val="bg1"/>
-                </a:solidFill>
-              </a:rPr>
+            <a:r>
+              <a:rPr lang="pt-PT" err="1"/>
               <a:t>Crud</a:t>
             </a:r>
             <a:r>
-              <a:rPr lang="pt-PT" sz="4400" dirty="0">
-                <a:solidFill>
-                  <a:schemeClr val="bg1"/>
-                </a:solidFill>
-              </a:rPr>
+              <a:rPr lang="pt-PT"/>
               <a:t> e listagens (</a:t>
             </a:r>
             <a:r>
-              <a:rPr lang="pt-PT" sz="4400" dirty="0" err="1">
-                <a:solidFill>
-                  <a:schemeClr val="bg1"/>
-                </a:solidFill>
-              </a:rPr>
+              <a:rPr lang="pt-PT" err="1"/>
               <a:t>CompletA</a:t>
             </a:r>
             <a:r>
-              <a:rPr lang="pt-PT" sz="4400" dirty="0">
-                <a:solidFill>
-                  <a:schemeClr val="bg1"/>
-                </a:solidFill>
-              </a:rPr>
+              <a:rPr lang="pt-PT"/>
               <a:t>)</a:t>
             </a:r>
           </a:p>
@@ -13431,10 +13449,10 @@
       </p:sp>
       <p:pic>
         <p:nvPicPr>
-          <p:cNvPr id="9" name="Marcador de Posição de Conteúdo 8">
+          <p:cNvPr id="4" name="Imagem 3" descr="Uma imagem com texto&#10;&#10;Descrição gerada automaticamente">
             <a:extLst>
               <a:ext uri="{FF2B5EF4-FFF2-40B4-BE49-F238E27FC236}">
-                <a16:creationId xmlns:a16="http://schemas.microsoft.com/office/drawing/2014/main" id="{36269267-2D8C-4B9E-922E-FABD0FD1BE9A}"/>
+                <a16:creationId xmlns:a16="http://schemas.microsoft.com/office/drawing/2014/main" id="{4F36E892-9717-4C68-B436-F9BCAB25632E}"/>
               </a:ext>
             </a:extLst>
           </p:cNvPr>
@@ -13451,13 +13469,13 @@
         </p:blipFill>
         <p:spPr>
           <a:xfrm>
-            <a:off x="1141411" y="2969235"/>
-            <a:ext cx="4689234" cy="2110154"/>
+            <a:off x="1035705" y="2672179"/>
+            <a:ext cx="4981371" cy="2403511"/>
           </a:xfrm>
           <a:prstGeom prst="round2DiagRect">
             <a:avLst>
               <a:gd name="adj1" fmla="val 5608"/>
-              <a:gd name="adj2" fmla="val 0"/>
+              <a:gd name="adj2" fmla="val 3924"/>
             </a:avLst>
           </a:prstGeom>
           <a:ln w="19050" cap="sq">

</xml_diff>